<commit_message>
working on conditional i.i.d. assumption throughout.  Also elaborated following De Finetti theorem statement.
</commit_message>
<xml_diff>
--- a/Thesis_Files/Graphics/PassThePigs/pics.pptx
+++ b/Thesis_Files/Graphics/PassThePigs/pics.pptx
@@ -259,7 +259,7 @@
           <a:p>
             <a:fld id="{4F6251BA-1414-4EF8-8B8C-C5017980A66E}" type="datetimeFigureOut">
               <a:rPr lang="en-US" smtClean="0"/>
-              <a:t>2/3/2022</a:t>
+              <a:t>3/8/2022</a:t>
             </a:fld>
             <a:endParaRPr lang="en-US"/>
           </a:p>
@@ -457,7 +457,7 @@
           <a:p>
             <a:fld id="{4F6251BA-1414-4EF8-8B8C-C5017980A66E}" type="datetimeFigureOut">
               <a:rPr lang="en-US" smtClean="0"/>
-              <a:t>2/3/2022</a:t>
+              <a:t>3/8/2022</a:t>
             </a:fld>
             <a:endParaRPr lang="en-US"/>
           </a:p>
@@ -665,7 +665,7 @@
           <a:p>
             <a:fld id="{4F6251BA-1414-4EF8-8B8C-C5017980A66E}" type="datetimeFigureOut">
               <a:rPr lang="en-US" smtClean="0"/>
-              <a:t>2/3/2022</a:t>
+              <a:t>3/8/2022</a:t>
             </a:fld>
             <a:endParaRPr lang="en-US"/>
           </a:p>
@@ -863,7 +863,7 @@
           <a:p>
             <a:fld id="{4F6251BA-1414-4EF8-8B8C-C5017980A66E}" type="datetimeFigureOut">
               <a:rPr lang="en-US" smtClean="0"/>
-              <a:t>2/3/2022</a:t>
+              <a:t>3/8/2022</a:t>
             </a:fld>
             <a:endParaRPr lang="en-US"/>
           </a:p>
@@ -1138,7 +1138,7 @@
           <a:p>
             <a:fld id="{4F6251BA-1414-4EF8-8B8C-C5017980A66E}" type="datetimeFigureOut">
               <a:rPr lang="en-US" smtClean="0"/>
-              <a:t>2/3/2022</a:t>
+              <a:t>3/8/2022</a:t>
             </a:fld>
             <a:endParaRPr lang="en-US"/>
           </a:p>
@@ -1403,7 +1403,7 @@
           <a:p>
             <a:fld id="{4F6251BA-1414-4EF8-8B8C-C5017980A66E}" type="datetimeFigureOut">
               <a:rPr lang="en-US" smtClean="0"/>
-              <a:t>2/3/2022</a:t>
+              <a:t>3/8/2022</a:t>
             </a:fld>
             <a:endParaRPr lang="en-US"/>
           </a:p>
@@ -1815,7 +1815,7 @@
           <a:p>
             <a:fld id="{4F6251BA-1414-4EF8-8B8C-C5017980A66E}" type="datetimeFigureOut">
               <a:rPr lang="en-US" smtClean="0"/>
-              <a:t>2/3/2022</a:t>
+              <a:t>3/8/2022</a:t>
             </a:fld>
             <a:endParaRPr lang="en-US"/>
           </a:p>
@@ -1956,7 +1956,7 @@
           <a:p>
             <a:fld id="{4F6251BA-1414-4EF8-8B8C-C5017980A66E}" type="datetimeFigureOut">
               <a:rPr lang="en-US" smtClean="0"/>
-              <a:t>2/3/2022</a:t>
+              <a:t>3/8/2022</a:t>
             </a:fld>
             <a:endParaRPr lang="en-US"/>
           </a:p>
@@ -2069,7 +2069,7 @@
           <a:p>
             <a:fld id="{4F6251BA-1414-4EF8-8B8C-C5017980A66E}" type="datetimeFigureOut">
               <a:rPr lang="en-US" smtClean="0"/>
-              <a:t>2/3/2022</a:t>
+              <a:t>3/8/2022</a:t>
             </a:fld>
             <a:endParaRPr lang="en-US"/>
           </a:p>
@@ -2380,7 +2380,7 @@
           <a:p>
             <a:fld id="{4F6251BA-1414-4EF8-8B8C-C5017980A66E}" type="datetimeFigureOut">
               <a:rPr lang="en-US" smtClean="0"/>
-              <a:t>2/3/2022</a:t>
+              <a:t>3/8/2022</a:t>
             </a:fld>
             <a:endParaRPr lang="en-US"/>
           </a:p>
@@ -2668,7 +2668,7 @@
           <a:p>
             <a:fld id="{4F6251BA-1414-4EF8-8B8C-C5017980A66E}" type="datetimeFigureOut">
               <a:rPr lang="en-US" smtClean="0"/>
-              <a:t>2/3/2022</a:t>
+              <a:t>3/8/2022</a:t>
             </a:fld>
             <a:endParaRPr lang="en-US"/>
           </a:p>
@@ -2909,7 +2909,7 @@
           <a:p>
             <a:fld id="{4F6251BA-1414-4EF8-8B8C-C5017980A66E}" type="datetimeFigureOut">
               <a:rPr lang="en-US" smtClean="0"/>
-              <a:t>2/3/2022</a:t>
+              <a:t>3/8/2022</a:t>
             </a:fld>
             <a:endParaRPr lang="en-US"/>
           </a:p>
@@ -3397,6 +3397,66 @@
           </a:prstGeom>
         </p:spPr>
       </p:pic>
+      <p:pic>
+        <p:nvPicPr>
+          <p:cNvPr id="4" name="Picture 3">
+            <a:extLst>
+              <a:ext uri="{FF2B5EF4-FFF2-40B4-BE49-F238E27FC236}">
+                <a16:creationId xmlns:a16="http://schemas.microsoft.com/office/drawing/2014/main" id="{0419806E-B876-49DB-8841-C2EF701CBBFE}"/>
+              </a:ext>
+            </a:extLst>
+          </p:cNvPr>
+          <p:cNvPicPr>
+            <a:picLocks noChangeAspect="1"/>
+          </p:cNvPicPr>
+          <p:nvPr/>
+        </p:nvPicPr>
+        <p:blipFill>
+          <a:blip r:embed="rId4"/>
+          <a:stretch>
+            <a:fillRect/>
+          </a:stretch>
+        </p:blipFill>
+        <p:spPr>
+          <a:xfrm>
+            <a:off x="1836798" y="2975420"/>
+            <a:ext cx="1114425" cy="819150"/>
+          </a:xfrm>
+          <a:prstGeom prst="rect">
+            <a:avLst/>
+          </a:prstGeom>
+        </p:spPr>
+      </p:pic>
+      <p:pic>
+        <p:nvPicPr>
+          <p:cNvPr id="10" name="Picture 9">
+            <a:extLst>
+              <a:ext uri="{FF2B5EF4-FFF2-40B4-BE49-F238E27FC236}">
+                <a16:creationId xmlns:a16="http://schemas.microsoft.com/office/drawing/2014/main" id="{5E48E099-B4E2-4834-A837-6116D83EBDE7}"/>
+              </a:ext>
+            </a:extLst>
+          </p:cNvPr>
+          <p:cNvPicPr>
+            <a:picLocks noChangeAspect="1"/>
+          </p:cNvPicPr>
+          <p:nvPr/>
+        </p:nvPicPr>
+        <p:blipFill>
+          <a:blip r:embed="rId5"/>
+          <a:stretch>
+            <a:fillRect/>
+          </a:stretch>
+        </p:blipFill>
+        <p:spPr>
+          <a:xfrm>
+            <a:off x="7963444" y="4942235"/>
+            <a:ext cx="3956647" cy="426757"/>
+          </a:xfrm>
+          <a:prstGeom prst="rect">
+            <a:avLst/>
+          </a:prstGeom>
+        </p:spPr>
+      </p:pic>
     </p:spTree>
     <p:extLst>
       <p:ext uri="{BB962C8B-B14F-4D97-AF65-F5344CB8AC3E}">

</xml_diff>